<commit_message>
Hardware: BB#2 higher-res pics
</commit_message>
<xml_diff>
--- a/Hardware/Breadboard #2/2016-12-02 BB#2 for BTNRH.pptx
+++ b/Hardware/Breadboard #2/2016-12-02 BB#2 for BTNRH.pptx
@@ -24,7 +24,7 @@
     <p:sldId id="269" r:id="rId12"/>
   </p:sldIdLst>
   <p:sldSz cx="9144000" cy="6858000" type="screen4x3"/>
-  <p:notesSz cx="7026275" cy="9312275"/>
+  <p:notesSz cx="7010400" cy="9296400"/>
   <p:defaultTextStyle>
     <a:defPPr>
       <a:defRPr lang="en-US"/>
@@ -158,14 +158,14 @@
         <p:spPr>
           <a:xfrm>
             <a:off x="0" y="0"/>
-            <a:ext cx="3044825" cy="465138"/>
+            <a:ext cx="3037946" cy="464345"/>
           </a:xfrm>
           <a:prstGeom prst="rect">
             <a:avLst/>
           </a:prstGeom>
         </p:spPr>
         <p:txBody>
-          <a:bodyPr vert="horz" lIns="91440" tIns="45720" rIns="91440" bIns="45720" rtlCol="0"/>
+          <a:bodyPr vert="horz" lIns="91257" tIns="45629" rIns="91257" bIns="45629" rtlCol="0"/>
           <a:lstStyle>
             <a:lvl1pPr algn="l">
               <a:defRPr sz="1200"/>
@@ -188,15 +188,15 @@
         </p:nvSpPr>
         <p:spPr>
           <a:xfrm>
-            <a:off x="3979863" y="0"/>
-            <a:ext cx="3044825" cy="465138"/>
+            <a:off x="3970871" y="0"/>
+            <a:ext cx="3037946" cy="464345"/>
           </a:xfrm>
           <a:prstGeom prst="rect">
             <a:avLst/>
           </a:prstGeom>
         </p:spPr>
         <p:txBody>
-          <a:bodyPr vert="horz" lIns="91440" tIns="45720" rIns="91440" bIns="45720" rtlCol="0"/>
+          <a:bodyPr vert="horz" lIns="91257" tIns="45629" rIns="91257" bIns="45629" rtlCol="0"/>
           <a:lstStyle>
             <a:lvl1pPr algn="r">
               <a:defRPr sz="1200"/>
@@ -223,15 +223,15 @@
         </p:nvSpPr>
         <p:spPr>
           <a:xfrm>
-            <a:off x="0" y="8845550"/>
-            <a:ext cx="3044825" cy="465138"/>
+            <a:off x="0" y="8830471"/>
+            <a:ext cx="3037946" cy="464345"/>
           </a:xfrm>
           <a:prstGeom prst="rect">
             <a:avLst/>
           </a:prstGeom>
         </p:spPr>
         <p:txBody>
-          <a:bodyPr vert="horz" lIns="91440" tIns="45720" rIns="91440" bIns="45720" rtlCol="0" anchor="b"/>
+          <a:bodyPr vert="horz" lIns="91257" tIns="45629" rIns="91257" bIns="45629" rtlCol="0" anchor="b"/>
           <a:lstStyle>
             <a:lvl1pPr algn="l">
               <a:defRPr sz="1200"/>
@@ -254,15 +254,15 @@
         </p:nvSpPr>
         <p:spPr>
           <a:xfrm>
-            <a:off x="3979863" y="8845550"/>
-            <a:ext cx="3044825" cy="465138"/>
+            <a:off x="3970871" y="8830471"/>
+            <a:ext cx="3037946" cy="464345"/>
           </a:xfrm>
           <a:prstGeom prst="rect">
             <a:avLst/>
           </a:prstGeom>
         </p:spPr>
         <p:txBody>
-          <a:bodyPr vert="horz" lIns="91440" tIns="45720" rIns="91440" bIns="45720" rtlCol="0" anchor="b"/>
+          <a:bodyPr vert="horz" lIns="91257" tIns="45629" rIns="91257" bIns="45629" rtlCol="0" anchor="b"/>
           <a:lstStyle>
             <a:lvl1pPr algn="r">
               <a:defRPr sz="1200"/>
@@ -323,14 +323,14 @@
         <p:spPr>
           <a:xfrm>
             <a:off x="0" y="0"/>
-            <a:ext cx="3044825" cy="465138"/>
+            <a:ext cx="3037946" cy="464345"/>
           </a:xfrm>
           <a:prstGeom prst="rect">
             <a:avLst/>
           </a:prstGeom>
         </p:spPr>
         <p:txBody>
-          <a:bodyPr vert="horz" lIns="91440" tIns="45720" rIns="91440" bIns="45720" rtlCol="0"/>
+          <a:bodyPr vert="horz" lIns="91257" tIns="45629" rIns="91257" bIns="45629" rtlCol="0"/>
           <a:lstStyle>
             <a:lvl1pPr algn="l">
               <a:defRPr sz="1200"/>
@@ -353,15 +353,15 @@
         </p:nvSpPr>
         <p:spPr>
           <a:xfrm>
-            <a:off x="3979863" y="0"/>
-            <a:ext cx="3044825" cy="465138"/>
+            <a:off x="3970871" y="0"/>
+            <a:ext cx="3037946" cy="464345"/>
           </a:xfrm>
           <a:prstGeom prst="rect">
             <a:avLst/>
           </a:prstGeom>
         </p:spPr>
         <p:txBody>
-          <a:bodyPr vert="horz" lIns="91440" tIns="45720" rIns="91440" bIns="45720" rtlCol="0"/>
+          <a:bodyPr vert="horz" lIns="91257" tIns="45629" rIns="91257" bIns="45629" rtlCol="0"/>
           <a:lstStyle>
             <a:lvl1pPr algn="r">
               <a:defRPr sz="1200"/>
@@ -388,8 +388,8 @@
         </p:nvSpPr>
         <p:spPr>
           <a:xfrm>
-            <a:off x="1184275" y="698500"/>
-            <a:ext cx="4657725" cy="3492500"/>
+            <a:off x="1181100" y="696913"/>
+            <a:ext cx="4648200" cy="3486150"/>
           </a:xfrm>
           <a:prstGeom prst="rect">
             <a:avLst/>
@@ -402,7 +402,7 @@
           </a:ln>
         </p:spPr>
         <p:txBody>
-          <a:bodyPr vert="horz" lIns="91440" tIns="45720" rIns="91440" bIns="45720" rtlCol="0" anchor="ctr"/>
+          <a:bodyPr vert="horz" lIns="91257" tIns="45629" rIns="91257" bIns="45629" rtlCol="0" anchor="ctr"/>
           <a:lstStyle/>
           <a:p>
             <a:endParaRPr lang="en-US"/>
@@ -421,15 +421,15 @@
         </p:nvSpPr>
         <p:spPr>
           <a:xfrm>
-            <a:off x="703263" y="4422775"/>
-            <a:ext cx="5619750" cy="4191000"/>
+            <a:off x="701674" y="4415236"/>
+            <a:ext cx="5607053" cy="4183855"/>
           </a:xfrm>
           <a:prstGeom prst="rect">
             <a:avLst/>
           </a:prstGeom>
         </p:spPr>
         <p:txBody>
-          <a:bodyPr vert="horz" lIns="91440" tIns="45720" rIns="91440" bIns="45720" rtlCol="0"/>
+          <a:bodyPr vert="horz" lIns="91257" tIns="45629" rIns="91257" bIns="45629" rtlCol="0"/>
           <a:lstStyle/>
           <a:p>
             <a:pPr lvl="0"/>
@@ -481,15 +481,15 @@
         </p:nvSpPr>
         <p:spPr>
           <a:xfrm>
-            <a:off x="0" y="8845550"/>
-            <a:ext cx="3044825" cy="465138"/>
+            <a:off x="0" y="8830471"/>
+            <a:ext cx="3037946" cy="464345"/>
           </a:xfrm>
           <a:prstGeom prst="rect">
             <a:avLst/>
           </a:prstGeom>
         </p:spPr>
         <p:txBody>
-          <a:bodyPr vert="horz" lIns="91440" tIns="45720" rIns="91440" bIns="45720" rtlCol="0" anchor="b"/>
+          <a:bodyPr vert="horz" lIns="91257" tIns="45629" rIns="91257" bIns="45629" rtlCol="0" anchor="b"/>
           <a:lstStyle>
             <a:lvl1pPr algn="l">
               <a:defRPr sz="1200"/>
@@ -512,15 +512,15 @@
         </p:nvSpPr>
         <p:spPr>
           <a:xfrm>
-            <a:off x="3979863" y="8845550"/>
-            <a:ext cx="3044825" cy="465138"/>
+            <a:off x="3970871" y="8830471"/>
+            <a:ext cx="3037946" cy="464345"/>
           </a:xfrm>
           <a:prstGeom prst="rect">
             <a:avLst/>
           </a:prstGeom>
         </p:spPr>
         <p:txBody>
-          <a:bodyPr vert="horz" lIns="91440" tIns="45720" rIns="91440" bIns="45720" rtlCol="0" anchor="b"/>
+          <a:bodyPr vert="horz" lIns="91257" tIns="45629" rIns="91257" bIns="45629" rtlCol="0" anchor="b"/>
           <a:lstStyle>
             <a:lvl1pPr algn="r">
               <a:defRPr sz="1200"/>
@@ -2727,39 +2727,16 @@
           <a:chExt cx="0" cy="0"/>
         </a:xfrm>
       </p:grpSpPr>
-      <p:sp>
-        <p:nvSpPr>
-          <p:cNvPr id="3" name="Title 2"/>
-          <p:cNvSpPr>
-            <a:spLocks noGrp="1"/>
-          </p:cNvSpPr>
-          <p:nvPr>
-            <p:ph type="title"/>
-          </p:nvPr>
-        </p:nvSpPr>
-        <p:spPr/>
-        <p:txBody>
-          <a:bodyPr/>
-          <a:lstStyle/>
-          <a:p>
-            <a:r>
-              <a:rPr lang="en-US" dirty="0" smtClean="0"/>
-              <a:t>All the Pieces</a:t>
-            </a:r>
-            <a:endParaRPr lang="en-US" dirty="0"/>
-          </a:p>
-        </p:txBody>
-      </p:sp>
       <p:pic>
         <p:nvPicPr>
-          <p:cNvPr id="5122" name="Picture 2" descr="C:\Users\wea\Desktop\2016-12-02 Breadboard 2 for BTNRH\IMG_7080.JPG"/>
+          <p:cNvPr id="30" name="Picture 2" descr="C:\Users\wea\Desktop\2016-12-02 Breadboard 2 for BTNRH\IMG_7080-001.JPG"/>
           <p:cNvPicPr>
             <a:picLocks noChangeAspect="1" noChangeArrowheads="1"/>
           </p:cNvPicPr>
           <p:nvPr/>
         </p:nvPicPr>
         <p:blipFill>
-          <a:blip r:embed="rId2">
+          <a:blip r:embed="rId2" cstate="print">
             <a:extLst>
               <a:ext uri="{28A0092B-C50C-407E-A947-70E740481C1C}">
                 <a14:useLocalDpi xmlns:a14="http://schemas.microsoft.com/office/drawing/2010/main" val="0"/>
@@ -2773,8 +2750,8 @@
         </p:blipFill>
         <p:spPr bwMode="auto">
           <a:xfrm>
-            <a:off x="1233948" y="1371600"/>
-            <a:ext cx="6172200" cy="4122961"/>
+            <a:off x="1301775" y="1371598"/>
+            <a:ext cx="6170582" cy="4122961"/>
           </a:xfrm>
           <a:prstGeom prst="rect">
             <a:avLst/>
@@ -2791,6 +2768,29 @@
           </a:extLst>
         </p:spPr>
       </p:pic>
+      <p:sp>
+        <p:nvSpPr>
+          <p:cNvPr id="3" name="Title 2"/>
+          <p:cNvSpPr>
+            <a:spLocks noGrp="1"/>
+          </p:cNvSpPr>
+          <p:nvPr>
+            <p:ph type="title"/>
+          </p:nvPr>
+        </p:nvSpPr>
+        <p:spPr/>
+        <p:txBody>
+          <a:bodyPr/>
+          <a:lstStyle/>
+          <a:p>
+            <a:r>
+              <a:rPr lang="en-US" dirty="0" smtClean="0"/>
+              <a:t>All the Pieces</a:t>
+            </a:r>
+            <a:endParaRPr lang="en-US" dirty="0"/>
+          </a:p>
+        </p:txBody>
+      </p:sp>
       <p:sp>
         <p:nvSpPr>
           <p:cNvPr id="4" name="TextBox 3"/>
@@ -4178,39 +4178,16 @@
           <a:chExt cx="0" cy="0"/>
         </a:xfrm>
       </p:grpSpPr>
-      <p:sp>
-        <p:nvSpPr>
-          <p:cNvPr id="3" name="Title 2"/>
-          <p:cNvSpPr>
-            <a:spLocks noGrp="1"/>
-          </p:cNvSpPr>
-          <p:nvPr>
-            <p:ph type="title"/>
-          </p:nvPr>
-        </p:nvSpPr>
-        <p:spPr/>
-        <p:txBody>
-          <a:bodyPr/>
-          <a:lstStyle/>
-          <a:p>
-            <a:r>
-              <a:rPr lang="en-US" dirty="0" smtClean="0"/>
-              <a:t>Overview of Breadboard #2</a:t>
-            </a:r>
-            <a:endParaRPr lang="en-US" dirty="0"/>
-          </a:p>
-        </p:txBody>
-      </p:sp>
       <p:pic>
         <p:nvPicPr>
-          <p:cNvPr id="4" name="Picture 2" descr="C:\Users\wea\Desktop\2016-12-02 Breadboard 2 for BTNRH\IMG_7080.JPG"/>
+          <p:cNvPr id="1026" name="Picture 2" descr="C:\Users\wea\Desktop\2016-12-02 Breadboard 2 for BTNRH\IMG_7080-001.JPG"/>
           <p:cNvPicPr>
             <a:picLocks noChangeAspect="1" noChangeArrowheads="1"/>
           </p:cNvPicPr>
           <p:nvPr/>
         </p:nvPicPr>
         <p:blipFill>
-          <a:blip r:embed="rId2">
+          <a:blip r:embed="rId2" cstate="print">
             <a:extLst>
               <a:ext uri="{28A0092B-C50C-407E-A947-70E740481C1C}">
                 <a14:useLocalDpi xmlns:a14="http://schemas.microsoft.com/office/drawing/2010/main" val="0"/>
@@ -4224,8 +4201,8 @@
         </p:blipFill>
         <p:spPr bwMode="auto">
           <a:xfrm>
-            <a:off x="1440425" y="1371598"/>
-            <a:ext cx="6172200" cy="4122961"/>
+            <a:off x="1429591" y="1371598"/>
+            <a:ext cx="6170582" cy="4122961"/>
           </a:xfrm>
           <a:prstGeom prst="rect">
             <a:avLst/>
@@ -4242,6 +4219,29 @@
           </a:extLst>
         </p:spPr>
       </p:pic>
+      <p:sp>
+        <p:nvSpPr>
+          <p:cNvPr id="3" name="Title 2"/>
+          <p:cNvSpPr>
+            <a:spLocks noGrp="1"/>
+          </p:cNvSpPr>
+          <p:nvPr>
+            <p:ph type="title"/>
+          </p:nvPr>
+        </p:nvSpPr>
+        <p:spPr/>
+        <p:txBody>
+          <a:bodyPr/>
+          <a:lstStyle/>
+          <a:p>
+            <a:r>
+              <a:rPr lang="en-US" dirty="0" smtClean="0"/>
+              <a:t>Overview of Breadboard #2</a:t>
+            </a:r>
+            <a:endParaRPr lang="en-US" dirty="0"/>
+          </a:p>
+        </p:txBody>
+      </p:sp>
       <p:sp>
         <p:nvSpPr>
           <p:cNvPr id="5" name="TextBox 4"/>

</xml_diff>

<commit_message>
Hardware: BB#2: Update lead figure
</commit_message>
<xml_diff>
--- a/Hardware/Breadboard #2/2016-12-02 BB#2 for BTNRH.pptx
+++ b/Hardware/Breadboard #2/2016-12-02 BB#2 for BTNRH.pptx
@@ -4510,8 +4510,8 @@
         </p:nvCxnSpPr>
         <p:spPr>
           <a:xfrm>
-            <a:off x="3431458" y="2005782"/>
-            <a:ext cx="835742" cy="481779"/>
+            <a:off x="3323303" y="2099579"/>
+            <a:ext cx="712839" cy="791104"/>
           </a:xfrm>
           <a:prstGeom prst="straightConnector1">
             <a:avLst/>
@@ -4546,8 +4546,8 @@
         </p:nvSpPr>
         <p:spPr>
           <a:xfrm>
-            <a:off x="1742598" y="1699469"/>
-            <a:ext cx="1846177" cy="400110"/>
+            <a:off x="1853380" y="1879860"/>
+            <a:ext cx="1964163" cy="400110"/>
           </a:xfrm>
           <a:prstGeom prst="rect">
             <a:avLst/>
@@ -4570,7 +4570,7 @@
             <a:pPr algn="ctr"/>
             <a:r>
               <a:rPr lang="en-US" sz="2000" b="1" dirty="0" smtClean="0"/>
-              <a:t>Recharge (USB)</a:t>
+              <a:t>Headphone Jack</a:t>
             </a:r>
             <a:endParaRPr lang="en-US" sz="2000" b="1" dirty="0"/>
           </a:p>

</xml_diff>